<commit_message>
update with new config file
</commit_message>
<xml_diff>
--- a/workflow.pptx
+++ b/workflow.pptx
@@ -6,7 +6,7 @@
   </p:sldMasterIdLst>
   <p:sldIdLst>
     <p:sldId id="256" r:id="rId2"/>
-    <p:sldId id="257" r:id="rId3"/>
+    <p:sldId id="258" r:id="rId3"/>
   </p:sldIdLst>
   <p:sldSz cx="12192000" cy="6858000"/>
   <p:notesSz cx="6858000" cy="9144000"/>
@@ -268,7 +268,7 @@
           <a:p>
             <a:fld id="{390A167D-EF3F-1C42-A6AF-ADC2FE9A5FA9}" type="datetimeFigureOut">
               <a:rPr lang="it-IT" smtClean="0"/>
-              <a:t>18/04/2024</a:t>
+              <a:t>04/07/2024</a:t>
             </a:fld>
             <a:endParaRPr lang="it-IT"/>
           </a:p>
@@ -466,7 +466,7 @@
           <a:p>
             <a:fld id="{390A167D-EF3F-1C42-A6AF-ADC2FE9A5FA9}" type="datetimeFigureOut">
               <a:rPr lang="it-IT" smtClean="0"/>
-              <a:t>18/04/2024</a:t>
+              <a:t>04/07/2024</a:t>
             </a:fld>
             <a:endParaRPr lang="it-IT"/>
           </a:p>
@@ -674,7 +674,7 @@
           <a:p>
             <a:fld id="{390A167D-EF3F-1C42-A6AF-ADC2FE9A5FA9}" type="datetimeFigureOut">
               <a:rPr lang="it-IT" smtClean="0"/>
-              <a:t>18/04/2024</a:t>
+              <a:t>04/07/2024</a:t>
             </a:fld>
             <a:endParaRPr lang="it-IT"/>
           </a:p>
@@ -872,7 +872,7 @@
           <a:p>
             <a:fld id="{390A167D-EF3F-1C42-A6AF-ADC2FE9A5FA9}" type="datetimeFigureOut">
               <a:rPr lang="it-IT" smtClean="0"/>
-              <a:t>18/04/2024</a:t>
+              <a:t>04/07/2024</a:t>
             </a:fld>
             <a:endParaRPr lang="it-IT"/>
           </a:p>
@@ -1147,7 +1147,7 @@
           <a:p>
             <a:fld id="{390A167D-EF3F-1C42-A6AF-ADC2FE9A5FA9}" type="datetimeFigureOut">
               <a:rPr lang="it-IT" smtClean="0"/>
-              <a:t>18/04/2024</a:t>
+              <a:t>04/07/2024</a:t>
             </a:fld>
             <a:endParaRPr lang="it-IT"/>
           </a:p>
@@ -1412,7 +1412,7 @@
           <a:p>
             <a:fld id="{390A167D-EF3F-1C42-A6AF-ADC2FE9A5FA9}" type="datetimeFigureOut">
               <a:rPr lang="it-IT" smtClean="0"/>
-              <a:t>18/04/2024</a:t>
+              <a:t>04/07/2024</a:t>
             </a:fld>
             <a:endParaRPr lang="it-IT"/>
           </a:p>
@@ -1824,7 +1824,7 @@
           <a:p>
             <a:fld id="{390A167D-EF3F-1C42-A6AF-ADC2FE9A5FA9}" type="datetimeFigureOut">
               <a:rPr lang="it-IT" smtClean="0"/>
-              <a:t>18/04/2024</a:t>
+              <a:t>04/07/2024</a:t>
             </a:fld>
             <a:endParaRPr lang="it-IT"/>
           </a:p>
@@ -1965,7 +1965,7 @@
           <a:p>
             <a:fld id="{390A167D-EF3F-1C42-A6AF-ADC2FE9A5FA9}" type="datetimeFigureOut">
               <a:rPr lang="it-IT" smtClean="0"/>
-              <a:t>18/04/2024</a:t>
+              <a:t>04/07/2024</a:t>
             </a:fld>
             <a:endParaRPr lang="it-IT"/>
           </a:p>
@@ -2078,7 +2078,7 @@
           <a:p>
             <a:fld id="{390A167D-EF3F-1C42-A6AF-ADC2FE9A5FA9}" type="datetimeFigureOut">
               <a:rPr lang="it-IT" smtClean="0"/>
-              <a:t>18/04/2024</a:t>
+              <a:t>04/07/2024</a:t>
             </a:fld>
             <a:endParaRPr lang="it-IT"/>
           </a:p>
@@ -2389,7 +2389,7 @@
           <a:p>
             <a:fld id="{390A167D-EF3F-1C42-A6AF-ADC2FE9A5FA9}" type="datetimeFigureOut">
               <a:rPr lang="it-IT" smtClean="0"/>
-              <a:t>18/04/2024</a:t>
+              <a:t>04/07/2024</a:t>
             </a:fld>
             <a:endParaRPr lang="it-IT"/>
           </a:p>
@@ -2677,7 +2677,7 @@
           <a:p>
             <a:fld id="{390A167D-EF3F-1C42-A6AF-ADC2FE9A5FA9}" type="datetimeFigureOut">
               <a:rPr lang="it-IT" smtClean="0"/>
-              <a:t>18/04/2024</a:t>
+              <a:t>04/07/2024</a:t>
             </a:fld>
             <a:endParaRPr lang="it-IT"/>
           </a:p>
@@ -2918,7 +2918,7 @@
           <a:p>
             <a:fld id="{390A167D-EF3F-1C42-A6AF-ADC2FE9A5FA9}" type="datetimeFigureOut">
               <a:rPr lang="it-IT" smtClean="0"/>
-              <a:t>18/04/2024</a:t>
+              <a:t>04/07/2024</a:t>
             </a:fld>
             <a:endParaRPr lang="it-IT"/>
           </a:p>
@@ -4058,12 +4058,10 @@
             <a:avLst/>
           </a:prstGeom>
           <a:solidFill>
-            <a:schemeClr val="accent4"/>
+            <a:schemeClr val="accent2"/>
           </a:solidFill>
           <a:ln w="28575">
-            <a:solidFill>
-              <a:schemeClr val="tx1"/>
-            </a:solidFill>
+            <a:noFill/>
           </a:ln>
         </p:spPr>
         <p:txBody>
@@ -4165,19 +4163,16 @@
               <a:rPr lang="it-IT" dirty="0">
                 <a:latin typeface="Book Antiqua" panose="02040602050305030304" pitchFamily="18" charset="0"/>
               </a:rPr>
-              <a:t>MIABIS </a:t>
-            </a:r>
-            <a:r>
-              <a:rPr lang="it-IT" dirty="0" err="1">
-                <a:latin typeface="Book Antiqua" panose="02040602050305030304" pitchFamily="18" charset="0"/>
-              </a:rPr>
-              <a:t>compliant</a:t>
-            </a:r>
+              <a:t>INPUT</a:t>
+            </a:r>
+          </a:p>
+          <a:p>
+            <a:pPr algn="ctr"/>
             <a:r>
               <a:rPr lang="it-IT" dirty="0">
                 <a:latin typeface="Book Antiqua" panose="02040602050305030304" pitchFamily="18" charset="0"/>
               </a:rPr>
-              <a:t> dataset</a:t>
+              <a:t>Dataset XLSX</a:t>
             </a:r>
           </a:p>
         </p:txBody>
@@ -4715,7 +4710,7 @@
     </p:spTree>
     <p:extLst>
       <p:ext uri="{BB962C8B-B14F-4D97-AF65-F5344CB8AC3E}">
-        <p14:creationId xmlns:p14="http://schemas.microsoft.com/office/powerpoint/2010/main" val="1951620186"/>
+        <p14:creationId xmlns:p14="http://schemas.microsoft.com/office/powerpoint/2010/main" val="442849180"/>
       </p:ext>
     </p:extLst>
   </p:cSld>

</xml_diff>